<commit_message>
Add Day 2 class materials
</commit_message>
<xml_diff>
--- a/slides/03 - Container Images.pptx
+++ b/slides/03 - Container Images.pptx
@@ -7169,7 +7169,7 @@
             </a:pPr>
             <a:r>
               <a:rPr lang="en"/>
-              <a:t>Public Repositories</a:t>
+              <a:t>Public Repositories - available for anyone to pull images</a:t>
             </a:r>
             <a:endParaRPr/>
           </a:p>
@@ -7209,7 +7209,7 @@
             </a:pPr>
             <a:r>
               <a:rPr lang="en"/>
-              <a:t>Private Repositories</a:t>
+              <a:t>Private Repositories - require additional authentication for private images</a:t>
             </a:r>
             <a:endParaRPr/>
           </a:p>
@@ -7230,6 +7230,26 @@
             <a:r>
               <a:rPr lang="en"/>
               <a:t>AWS ECR, Github, etc.</a:t>
+            </a:r>
+            <a:endParaRPr/>
+          </a:p>
+          <a:p>
+            <a:pPr indent="-317500" lvl="1" marL="914400" rtl="0" algn="l">
+              <a:lnSpc>
+                <a:spcPct val="200000"/>
+              </a:lnSpc>
+              <a:spcBef>
+                <a:spcPts val="0"/>
+              </a:spcBef>
+              <a:spcAft>
+                <a:spcPts val="0"/>
+              </a:spcAft>
+              <a:buSzPts val="1400"/>
+              <a:buChar char="○"/>
+            </a:pPr>
+            <a:r>
+              <a:rPr lang="en"/>
+              <a:t>Docker Hub (private repo)</a:t>
             </a:r>
             <a:endParaRPr/>
           </a:p>
@@ -8758,7 +8778,7 @@
           <a:p>
             <a:pPr indent="-342900" lvl="0" marL="457200" rtl="0" algn="l">
               <a:lnSpc>
-                <a:spcPct val="200000"/>
+                <a:spcPct val="150000"/>
               </a:lnSpc>
               <a:spcBef>
                 <a:spcPts val="0"/>
@@ -8778,7 +8798,7 @@
           <a:p>
             <a:pPr indent="-342900" lvl="0" marL="457200" rtl="0" algn="l">
               <a:lnSpc>
-                <a:spcPct val="200000"/>
+                <a:spcPct val="150000"/>
               </a:lnSpc>
               <a:spcBef>
                 <a:spcPts val="0"/>
@@ -8798,7 +8818,7 @@
           <a:p>
             <a:pPr indent="-342900" lvl="0" marL="457200" rtl="0" algn="l">
               <a:lnSpc>
-                <a:spcPct val="200000"/>
+                <a:spcPct val="150000"/>
               </a:lnSpc>
               <a:spcBef>
                 <a:spcPts val="0"/>
@@ -8818,7 +8838,7 @@
           <a:p>
             <a:pPr indent="-342900" lvl="0" marL="457200" rtl="0" algn="l">
               <a:lnSpc>
-                <a:spcPct val="200000"/>
+                <a:spcPct val="150000"/>
               </a:lnSpc>
               <a:spcBef>
                 <a:spcPts val="0"/>
@@ -8838,7 +8858,47 @@
           <a:p>
             <a:pPr indent="-342900" lvl="0" marL="457200" rtl="0" algn="l">
               <a:lnSpc>
-                <a:spcPct val="200000"/>
+                <a:spcPct val="150000"/>
+              </a:lnSpc>
+              <a:spcBef>
+                <a:spcPts val="0"/>
+              </a:spcBef>
+              <a:spcAft>
+                <a:spcPts val="0"/>
+              </a:spcAft>
+              <a:buSzPts val="1800"/>
+              <a:buChar char="●"/>
+            </a:pPr>
+            <a:r>
+              <a:rPr lang="en"/>
+              <a:t>EXPOSE: Open ports for network traffic</a:t>
+            </a:r>
+            <a:endParaRPr/>
+          </a:p>
+          <a:p>
+            <a:pPr indent="-342900" lvl="0" marL="457200" rtl="0" algn="l">
+              <a:lnSpc>
+                <a:spcPct val="150000"/>
+              </a:lnSpc>
+              <a:spcBef>
+                <a:spcPts val="0"/>
+              </a:spcBef>
+              <a:spcAft>
+                <a:spcPts val="0"/>
+              </a:spcAft>
+              <a:buSzPts val="1800"/>
+              <a:buChar char="●"/>
+            </a:pPr>
+            <a:r>
+              <a:rPr lang="en"/>
+              <a:t>USER: Select user / group ids to run container processes</a:t>
+            </a:r>
+            <a:endParaRPr/>
+          </a:p>
+          <a:p>
+            <a:pPr indent="-342900" lvl="0" marL="457200" rtl="0" algn="l">
+              <a:lnSpc>
+                <a:spcPct val="150000"/>
               </a:lnSpc>
               <a:spcBef>
                 <a:spcPts val="0"/>
@@ -9000,6 +9060,26 @@
             </a:pPr>
             <a:r>
               <a:rPr lang="en"/>
+              <a:t>Inspect image</a:t>
+            </a:r>
+            <a:endParaRPr/>
+          </a:p>
+          <a:p>
+            <a:pPr indent="-342900" lvl="0" marL="457200" rtl="0" algn="l">
+              <a:lnSpc>
+                <a:spcPct val="200000"/>
+              </a:lnSpc>
+              <a:spcBef>
+                <a:spcPts val="0"/>
+              </a:spcBef>
+              <a:spcAft>
+                <a:spcPts val="0"/>
+              </a:spcAft>
+              <a:buSzPts val="1800"/>
+              <a:buChar char="●"/>
+            </a:pPr>
+            <a:r>
+              <a:rPr lang="en"/>
               <a:t>Delete image</a:t>
             </a:r>
             <a:endParaRPr/>
@@ -9021,26 +9101,6 @@
             <a:r>
               <a:rPr lang="en"/>
               <a:t>Purge image</a:t>
-            </a:r>
-            <a:endParaRPr/>
-          </a:p>
-          <a:p>
-            <a:pPr indent="-342900" lvl="0" marL="457200" rtl="0" algn="l">
-              <a:lnSpc>
-                <a:spcPct val="200000"/>
-              </a:lnSpc>
-              <a:spcBef>
-                <a:spcPts val="0"/>
-              </a:spcBef>
-              <a:spcAft>
-                <a:spcPts val="0"/>
-              </a:spcAft>
-              <a:buSzPts val="1800"/>
-              <a:buChar char="●"/>
-            </a:pPr>
-            <a:r>
-              <a:rPr lang="en"/>
-              <a:t>Inspect image</a:t>
             </a:r>
             <a:endParaRPr/>
           </a:p>

</xml_diff>